<commit_message>
updates to Rtidyverse slides 2/25
</commit_message>
<xml_diff>
--- a/Lecture1/RTidyVerse.pptx
+++ b/Lecture1/RTidyVerse.pptx
@@ -10,7 +10,11 @@
     <p:sldId id="262" r:id="rId4"/>
     <p:sldId id="263" r:id="rId5"/>
     <p:sldId id="260" r:id="rId6"/>
-    <p:sldId id="261" r:id="rId7"/>
+    <p:sldId id="264" r:id="rId7"/>
+    <p:sldId id="265" r:id="rId8"/>
+    <p:sldId id="266" r:id="rId9"/>
+    <p:sldId id="267" r:id="rId10"/>
+    <p:sldId id="261" r:id="rId11"/>
   </p:sldIdLst>
   <p:sldSz cx="12192000" cy="6858000"/>
   <p:notesSz cx="6858000" cy="9144000"/>
@@ -264,7 +268,7 @@
           <a:p>
             <a:fld id="{F208F35E-668F-45A6-BDFA-ED38F63C0CDD}" type="datetimeFigureOut">
               <a:rPr lang="en-US" smtClean="0"/>
-              <a:t>2/17/2020</a:t>
+              <a:t>2/25/2020</a:t>
             </a:fld>
             <a:endParaRPr lang="en-US"/>
           </a:p>
@@ -462,7 +466,7 @@
           <a:p>
             <a:fld id="{F208F35E-668F-45A6-BDFA-ED38F63C0CDD}" type="datetimeFigureOut">
               <a:rPr lang="en-US" smtClean="0"/>
-              <a:t>2/17/2020</a:t>
+              <a:t>2/25/2020</a:t>
             </a:fld>
             <a:endParaRPr lang="en-US"/>
           </a:p>
@@ -670,7 +674,7 @@
           <a:p>
             <a:fld id="{F208F35E-668F-45A6-BDFA-ED38F63C0CDD}" type="datetimeFigureOut">
               <a:rPr lang="en-US" smtClean="0"/>
-              <a:t>2/17/2020</a:t>
+              <a:t>2/25/2020</a:t>
             </a:fld>
             <a:endParaRPr lang="en-US"/>
           </a:p>
@@ -868,7 +872,7 @@
           <a:p>
             <a:fld id="{F208F35E-668F-45A6-BDFA-ED38F63C0CDD}" type="datetimeFigureOut">
               <a:rPr lang="en-US" smtClean="0"/>
-              <a:t>2/17/2020</a:t>
+              <a:t>2/25/2020</a:t>
             </a:fld>
             <a:endParaRPr lang="en-US"/>
           </a:p>
@@ -1143,7 +1147,7 @@
           <a:p>
             <a:fld id="{F208F35E-668F-45A6-BDFA-ED38F63C0CDD}" type="datetimeFigureOut">
               <a:rPr lang="en-US" smtClean="0"/>
-              <a:t>2/17/2020</a:t>
+              <a:t>2/25/2020</a:t>
             </a:fld>
             <a:endParaRPr lang="en-US"/>
           </a:p>
@@ -1408,7 +1412,7 @@
           <a:p>
             <a:fld id="{F208F35E-668F-45A6-BDFA-ED38F63C0CDD}" type="datetimeFigureOut">
               <a:rPr lang="en-US" smtClean="0"/>
-              <a:t>2/17/2020</a:t>
+              <a:t>2/25/2020</a:t>
             </a:fld>
             <a:endParaRPr lang="en-US"/>
           </a:p>
@@ -1820,7 +1824,7 @@
           <a:p>
             <a:fld id="{F208F35E-668F-45A6-BDFA-ED38F63C0CDD}" type="datetimeFigureOut">
               <a:rPr lang="en-US" smtClean="0"/>
-              <a:t>2/17/2020</a:t>
+              <a:t>2/25/2020</a:t>
             </a:fld>
             <a:endParaRPr lang="en-US"/>
           </a:p>
@@ -1961,7 +1965,7 @@
           <a:p>
             <a:fld id="{F208F35E-668F-45A6-BDFA-ED38F63C0CDD}" type="datetimeFigureOut">
               <a:rPr lang="en-US" smtClean="0"/>
-              <a:t>2/17/2020</a:t>
+              <a:t>2/25/2020</a:t>
             </a:fld>
             <a:endParaRPr lang="en-US"/>
           </a:p>
@@ -2074,7 +2078,7 @@
           <a:p>
             <a:fld id="{F208F35E-668F-45A6-BDFA-ED38F63C0CDD}" type="datetimeFigureOut">
               <a:rPr lang="en-US" smtClean="0"/>
-              <a:t>2/17/2020</a:t>
+              <a:t>2/25/2020</a:t>
             </a:fld>
             <a:endParaRPr lang="en-US"/>
           </a:p>
@@ -2385,7 +2389,7 @@
           <a:p>
             <a:fld id="{F208F35E-668F-45A6-BDFA-ED38F63C0CDD}" type="datetimeFigureOut">
               <a:rPr lang="en-US" smtClean="0"/>
-              <a:t>2/17/2020</a:t>
+              <a:t>2/25/2020</a:t>
             </a:fld>
             <a:endParaRPr lang="en-US"/>
           </a:p>
@@ -2673,7 +2677,7 @@
           <a:p>
             <a:fld id="{F208F35E-668F-45A6-BDFA-ED38F63C0CDD}" type="datetimeFigureOut">
               <a:rPr lang="en-US" smtClean="0"/>
-              <a:t>2/17/2020</a:t>
+              <a:t>2/25/2020</a:t>
             </a:fld>
             <a:endParaRPr lang="en-US"/>
           </a:p>
@@ -2914,7 +2918,7 @@
           <a:p>
             <a:fld id="{F208F35E-668F-45A6-BDFA-ED38F63C0CDD}" type="datetimeFigureOut">
               <a:rPr lang="en-US" smtClean="0"/>
-              <a:t>2/17/2020</a:t>
+              <a:t>2/25/2020</a:t>
             </a:fld>
             <a:endParaRPr lang="en-US"/>
           </a:p>
@@ -3417,6 +3421,143 @@
 </p:sld>
 </file>
 
+<file path=ppt/slides/slide10.xml><?xml version="1.0" encoding="utf-8"?>
+<p:sld xmlns:a="http://schemas.openxmlformats.org/drawingml/2006/main" xmlns:r="http://schemas.openxmlformats.org/officeDocument/2006/relationships" xmlns:p="http://schemas.openxmlformats.org/presentationml/2006/main">
+  <p:cSld>
+    <p:spTree>
+      <p:nvGrpSpPr>
+        <p:cNvPr id="1" name=""/>
+        <p:cNvGrpSpPr/>
+        <p:nvPr/>
+      </p:nvGrpSpPr>
+      <p:grpSpPr>
+        <a:xfrm>
+          <a:off x="0" y="0"/>
+          <a:ext cx="0" cy="0"/>
+          <a:chOff x="0" y="0"/>
+          <a:chExt cx="0" cy="0"/>
+        </a:xfrm>
+      </p:grpSpPr>
+      <p:sp>
+        <p:nvSpPr>
+          <p:cNvPr id="2" name="Title 1">
+            <a:extLst>
+              <a:ext uri="{FF2B5EF4-FFF2-40B4-BE49-F238E27FC236}">
+                <a16:creationId xmlns:a16="http://schemas.microsoft.com/office/drawing/2014/main" id="{AA6673C8-1619-470E-8B44-3C7187C99B16}"/>
+              </a:ext>
+            </a:extLst>
+          </p:cNvPr>
+          <p:cNvSpPr>
+            <a:spLocks noGrp="1"/>
+          </p:cNvSpPr>
+          <p:nvPr>
+            <p:ph type="title"/>
+          </p:nvPr>
+        </p:nvSpPr>
+        <p:spPr/>
+        <p:txBody>
+          <a:bodyPr/>
+          <a:lstStyle/>
+          <a:p>
+            <a:r>
+              <a:rPr lang="en-US" dirty="0"/>
+              <a:t>Help on the </a:t>
+            </a:r>
+            <a:r>
+              <a:rPr lang="en-US" dirty="0" err="1"/>
+              <a:t>Tidyverse</a:t>
+            </a:r>
+            <a:endParaRPr lang="en-US" dirty="0"/>
+          </a:p>
+        </p:txBody>
+      </p:sp>
+      <p:sp>
+        <p:nvSpPr>
+          <p:cNvPr id="3" name="Content Placeholder 2">
+            <a:extLst>
+              <a:ext uri="{FF2B5EF4-FFF2-40B4-BE49-F238E27FC236}">
+                <a16:creationId xmlns:a16="http://schemas.microsoft.com/office/drawing/2014/main" id="{D507F7B5-2852-4DEB-ADF8-A3237BEC5EF0}"/>
+              </a:ext>
+            </a:extLst>
+          </p:cNvPr>
+          <p:cNvSpPr>
+            <a:spLocks noGrp="1"/>
+          </p:cNvSpPr>
+          <p:nvPr>
+            <p:ph idx="1"/>
+          </p:nvPr>
+        </p:nvSpPr>
+        <p:spPr/>
+        <p:txBody>
+          <a:bodyPr/>
+          <a:lstStyle/>
+          <a:p>
+            <a:r>
+              <a:rPr lang="en-US" dirty="0" err="1"/>
+              <a:t>Rstudio</a:t>
+            </a:r>
+            <a:r>
+              <a:rPr lang="en-US" dirty="0"/>
+              <a:t> Cheat Sheets!</a:t>
+            </a:r>
+          </a:p>
+          <a:p>
+            <a:pPr lvl="1"/>
+            <a:r>
+              <a:rPr lang="en-US" dirty="0">
+                <a:hlinkClick r:id="rId2"/>
+              </a:rPr>
+              <a:t>https://www.rstudio.com/resources/cheatsheets/</a:t>
+            </a:r>
+            <a:endParaRPr lang="en-US" dirty="0"/>
+          </a:p>
+          <a:p>
+            <a:r>
+              <a:rPr lang="en-US" dirty="0"/>
+              <a:t>R for Data Science</a:t>
+            </a:r>
+          </a:p>
+          <a:p>
+            <a:pPr lvl="1"/>
+            <a:r>
+              <a:rPr lang="en-US" dirty="0">
+                <a:hlinkClick r:id="rId3"/>
+              </a:rPr>
+              <a:t>http://r4ds.had.co.nz/</a:t>
+            </a:r>
+            <a:endParaRPr lang="en-US" dirty="0"/>
+          </a:p>
+          <a:p>
+            <a:r>
+              <a:rPr lang="en-US" dirty="0"/>
+              <a:t>Feature Engineering and Selection</a:t>
+            </a:r>
+          </a:p>
+          <a:p>
+            <a:pPr lvl="1"/>
+            <a:r>
+              <a:rPr lang="en-US" dirty="0">
+                <a:hlinkClick r:id="rId4"/>
+              </a:rPr>
+              <a:t>https://bookdown.org/max/FES/</a:t>
+            </a:r>
+            <a:endParaRPr lang="en-US" dirty="0"/>
+          </a:p>
+        </p:txBody>
+      </p:sp>
+    </p:spTree>
+    <p:extLst>
+      <p:ext uri="{BB962C8B-B14F-4D97-AF65-F5344CB8AC3E}">
+        <p14:creationId xmlns:p14="http://schemas.microsoft.com/office/powerpoint/2010/main" val="3819666239"/>
+      </p:ext>
+    </p:extLst>
+  </p:cSld>
+  <p:clrMapOvr>
+    <a:masterClrMapping/>
+  </p:clrMapOvr>
+</p:sld>
+</file>
+
 <file path=ppt/slides/slide2.xml><?xml version="1.0" encoding="utf-8"?>
 <p:sld xmlns:a="http://schemas.openxmlformats.org/drawingml/2006/main" xmlns:r="http://schemas.openxmlformats.org/officeDocument/2006/relationships" xmlns:p="http://schemas.openxmlformats.org/presentationml/2006/main">
   <p:cSld>
@@ -3839,7 +3980,7 @@
           <p:cNvPr id="2" name="Title 1">
             <a:extLst>
               <a:ext uri="{FF2B5EF4-FFF2-40B4-BE49-F238E27FC236}">
-                <a16:creationId xmlns:a16="http://schemas.microsoft.com/office/drawing/2014/main" id="{AA6673C8-1619-470E-8B44-3C7187C99B16}"/>
+                <a16:creationId xmlns:a16="http://schemas.microsoft.com/office/drawing/2014/main" id="{10DB27AC-06D3-470B-8164-E75FF7B594B2}"/>
               </a:ext>
             </a:extLst>
           </p:cNvPr>
@@ -3857,94 +3998,489 @@
           <a:p>
             <a:r>
               <a:rPr lang="en-US" dirty="0"/>
-              <a:t>Help on the </a:t>
-            </a:r>
-            <a:r>
-              <a:rPr lang="en-US" dirty="0" err="1"/>
-              <a:t>Tidyverse</a:t>
-            </a:r>
-            <a:endParaRPr lang="en-US" dirty="0"/>
-          </a:p>
-        </p:txBody>
-      </p:sp>
-      <p:sp>
-        <p:nvSpPr>
-          <p:cNvPr id="3" name="Content Placeholder 2">
-            <a:extLst>
-              <a:ext uri="{FF2B5EF4-FFF2-40B4-BE49-F238E27FC236}">
-                <a16:creationId xmlns:a16="http://schemas.microsoft.com/office/drawing/2014/main" id="{D507F7B5-2852-4DEB-ADF8-A3237BEC5EF0}"/>
-              </a:ext>
-            </a:extLst>
-          </p:cNvPr>
-          <p:cNvSpPr>
-            <a:spLocks noGrp="1"/>
-          </p:cNvSpPr>
-          <p:nvPr>
-            <p:ph idx="1"/>
-          </p:nvPr>
-        </p:nvSpPr>
-        <p:spPr/>
-        <p:txBody>
-          <a:bodyPr/>
-          <a:lstStyle/>
-          <a:p>
-            <a:r>
-              <a:rPr lang="en-US" dirty="0" err="1"/>
-              <a:t>Rstudio</a:t>
-            </a:r>
-            <a:r>
-              <a:rPr lang="en-US" dirty="0"/>
-              <a:t> Cheat Sheets!</a:t>
-            </a:r>
-          </a:p>
-          <a:p>
-            <a:pPr lvl="1"/>
-            <a:r>
-              <a:rPr lang="en-US" dirty="0">
-                <a:hlinkClick r:id="rId2"/>
-              </a:rPr>
-              <a:t>https://www.rstudio.com/resources/cheatsheets/</a:t>
-            </a:r>
-            <a:endParaRPr lang="en-US" dirty="0"/>
-          </a:p>
-          <a:p>
-            <a:r>
-              <a:rPr lang="en-US" dirty="0"/>
-              <a:t>R for Data Science</a:t>
-            </a:r>
-          </a:p>
-          <a:p>
-            <a:pPr lvl="1"/>
-            <a:r>
-              <a:rPr lang="en-US" dirty="0">
-                <a:hlinkClick r:id="rId3"/>
-              </a:rPr>
-              <a:t>http://r4ds.had.co.nz/</a:t>
-            </a:r>
-            <a:endParaRPr lang="en-US" dirty="0"/>
-          </a:p>
-          <a:p>
-            <a:r>
-              <a:rPr lang="en-US" dirty="0"/>
-              <a:t>Feature Engineering and Selection</a:t>
-            </a:r>
-          </a:p>
-          <a:p>
-            <a:pPr lvl="1"/>
-            <a:r>
-              <a:rPr lang="en-US" dirty="0">
-                <a:hlinkClick r:id="rId4"/>
-              </a:rPr>
-              <a:t>https://bookdown.org/max/FES/</a:t>
-            </a:r>
-            <a:endParaRPr lang="en-US" dirty="0"/>
-          </a:p>
-        </p:txBody>
-      </p:sp>
+              <a:t>Project-Based Workflow</a:t>
+            </a:r>
+          </a:p>
+        </p:txBody>
+      </p:sp>
+      <p:sp>
+        <p:nvSpPr>
+          <p:cNvPr id="5" name="AutoShape 6">
+            <a:extLst>
+              <a:ext uri="{FF2B5EF4-FFF2-40B4-BE49-F238E27FC236}">
+                <a16:creationId xmlns:a16="http://schemas.microsoft.com/office/drawing/2014/main" id="{43170AE7-A2E3-40F4-A669-2085661DC4A1}"/>
+              </a:ext>
+            </a:extLst>
+          </p:cNvPr>
+          <p:cNvSpPr>
+            <a:spLocks noChangeAspect="1" noChangeArrowheads="1"/>
+          </p:cNvSpPr>
+          <p:nvPr/>
+        </p:nvSpPr>
+        <p:spPr bwMode="auto">
+          <a:xfrm>
+            <a:off x="5943600" y="3276600"/>
+            <a:ext cx="304800" cy="304800"/>
+          </a:xfrm>
+          <a:prstGeom prst="rect">
+            <a:avLst/>
+          </a:prstGeom>
+          <a:noFill/>
+          <a:extLst>
+            <a:ext uri="{909E8E84-426E-40DD-AFC4-6F175D3DCCD1}">
+              <a14:hiddenFill xmlns:a14="http://schemas.microsoft.com/office/drawing/2010/main">
+                <a:solidFill>
+                  <a:srgbClr val="FFFFFF"/>
+                </a:solidFill>
+              </a14:hiddenFill>
+            </a:ext>
+          </a:extLst>
+        </p:spPr>
+        <p:txBody>
+          <a:bodyPr vert="horz" wrap="square" lIns="91440" tIns="45720" rIns="91440" bIns="45720" numCol="1" anchor="t" anchorCtr="0" compatLnSpc="1">
+            <a:prstTxWarp prst="textNoShape">
+              <a:avLst/>
+            </a:prstTxWarp>
+          </a:bodyPr>
+          <a:lstStyle/>
+          <a:p>
+            <a:endParaRPr lang="en-US"/>
+          </a:p>
+        </p:txBody>
+      </p:sp>
+      <p:pic>
+        <p:nvPicPr>
+          <p:cNvPr id="6" name="Picture 5">
+            <a:extLst>
+              <a:ext uri="{FF2B5EF4-FFF2-40B4-BE49-F238E27FC236}">
+                <a16:creationId xmlns:a16="http://schemas.microsoft.com/office/drawing/2014/main" id="{8DF2CBF0-4AC0-4017-836D-6F2C45F0082B}"/>
+              </a:ext>
+            </a:extLst>
+          </p:cNvPr>
+          <p:cNvPicPr>
+            <a:picLocks noChangeAspect="1"/>
+          </p:cNvPicPr>
+          <p:nvPr/>
+        </p:nvPicPr>
+        <p:blipFill>
+          <a:blip r:embed="rId2"/>
+          <a:stretch>
+            <a:fillRect/>
+          </a:stretch>
+        </p:blipFill>
+        <p:spPr>
+          <a:xfrm>
+            <a:off x="1776952" y="1840427"/>
+            <a:ext cx="8638095" cy="3740069"/>
+          </a:xfrm>
+          <a:prstGeom prst="rect">
+            <a:avLst/>
+          </a:prstGeom>
+        </p:spPr>
+      </p:pic>
     </p:spTree>
     <p:extLst>
       <p:ext uri="{BB962C8B-B14F-4D97-AF65-F5344CB8AC3E}">
-        <p14:creationId xmlns:p14="http://schemas.microsoft.com/office/powerpoint/2010/main" val="3819666239"/>
+        <p14:creationId xmlns:p14="http://schemas.microsoft.com/office/powerpoint/2010/main" val="2037376048"/>
+      </p:ext>
+    </p:extLst>
+  </p:cSld>
+  <p:clrMapOvr>
+    <a:masterClrMapping/>
+  </p:clrMapOvr>
+</p:sld>
+</file>
+
+<file path=ppt/slides/slide7.xml><?xml version="1.0" encoding="utf-8"?>
+<p:sld xmlns:a="http://schemas.openxmlformats.org/drawingml/2006/main" xmlns:r="http://schemas.openxmlformats.org/officeDocument/2006/relationships" xmlns:p="http://schemas.openxmlformats.org/presentationml/2006/main">
+  <p:cSld>
+    <p:spTree>
+      <p:nvGrpSpPr>
+        <p:cNvPr id="1" name=""/>
+        <p:cNvGrpSpPr/>
+        <p:nvPr/>
+      </p:nvGrpSpPr>
+      <p:grpSpPr>
+        <a:xfrm>
+          <a:off x="0" y="0"/>
+          <a:ext cx="0" cy="0"/>
+          <a:chOff x="0" y="0"/>
+          <a:chExt cx="0" cy="0"/>
+        </a:xfrm>
+      </p:grpSpPr>
+      <p:sp>
+        <p:nvSpPr>
+          <p:cNvPr id="2" name="Title 1">
+            <a:extLst>
+              <a:ext uri="{FF2B5EF4-FFF2-40B4-BE49-F238E27FC236}">
+                <a16:creationId xmlns:a16="http://schemas.microsoft.com/office/drawing/2014/main" id="{10DB27AC-06D3-470B-8164-E75FF7B594B2}"/>
+              </a:ext>
+            </a:extLst>
+          </p:cNvPr>
+          <p:cNvSpPr>
+            <a:spLocks noGrp="1"/>
+          </p:cNvSpPr>
+          <p:nvPr>
+            <p:ph type="title"/>
+          </p:nvPr>
+        </p:nvSpPr>
+        <p:spPr/>
+        <p:txBody>
+          <a:bodyPr/>
+          <a:lstStyle/>
+          <a:p>
+            <a:r>
+              <a:rPr lang="en-US" dirty="0"/>
+              <a:t>Project-Based Workflow</a:t>
+            </a:r>
+          </a:p>
+        </p:txBody>
+      </p:sp>
+      <p:sp>
+        <p:nvSpPr>
+          <p:cNvPr id="5" name="AutoShape 6">
+            <a:extLst>
+              <a:ext uri="{FF2B5EF4-FFF2-40B4-BE49-F238E27FC236}">
+                <a16:creationId xmlns:a16="http://schemas.microsoft.com/office/drawing/2014/main" id="{43170AE7-A2E3-40F4-A669-2085661DC4A1}"/>
+              </a:ext>
+            </a:extLst>
+          </p:cNvPr>
+          <p:cNvSpPr>
+            <a:spLocks noChangeAspect="1" noChangeArrowheads="1"/>
+          </p:cNvSpPr>
+          <p:nvPr/>
+        </p:nvSpPr>
+        <p:spPr bwMode="auto">
+          <a:xfrm>
+            <a:off x="5943600" y="3276600"/>
+            <a:ext cx="304800" cy="304800"/>
+          </a:xfrm>
+          <a:prstGeom prst="rect">
+            <a:avLst/>
+          </a:prstGeom>
+          <a:noFill/>
+          <a:extLst>
+            <a:ext uri="{909E8E84-426E-40DD-AFC4-6F175D3DCCD1}">
+              <a14:hiddenFill xmlns:a14="http://schemas.microsoft.com/office/drawing/2010/main">
+                <a:solidFill>
+                  <a:srgbClr val="FFFFFF"/>
+                </a:solidFill>
+              </a14:hiddenFill>
+            </a:ext>
+          </a:extLst>
+        </p:spPr>
+        <p:txBody>
+          <a:bodyPr vert="horz" wrap="square" lIns="91440" tIns="45720" rIns="91440" bIns="45720" numCol="1" anchor="t" anchorCtr="0" compatLnSpc="1">
+            <a:prstTxWarp prst="textNoShape">
+              <a:avLst/>
+            </a:prstTxWarp>
+          </a:bodyPr>
+          <a:lstStyle/>
+          <a:p>
+            <a:endParaRPr lang="en-US"/>
+          </a:p>
+        </p:txBody>
+      </p:sp>
+      <p:pic>
+        <p:nvPicPr>
+          <p:cNvPr id="3" name="Picture 2">
+            <a:extLst>
+              <a:ext uri="{FF2B5EF4-FFF2-40B4-BE49-F238E27FC236}">
+                <a16:creationId xmlns:a16="http://schemas.microsoft.com/office/drawing/2014/main" id="{CC40EBE4-BB10-435B-9CD2-10A1DD2ECB57}"/>
+              </a:ext>
+            </a:extLst>
+          </p:cNvPr>
+          <p:cNvPicPr>
+            <a:picLocks noChangeAspect="1"/>
+          </p:cNvPicPr>
+          <p:nvPr/>
+        </p:nvPicPr>
+        <p:blipFill>
+          <a:blip r:embed="rId2"/>
+          <a:stretch>
+            <a:fillRect/>
+          </a:stretch>
+        </p:blipFill>
+        <p:spPr>
+          <a:xfrm>
+            <a:off x="1548492" y="1913640"/>
+            <a:ext cx="9095015" cy="3480633"/>
+          </a:xfrm>
+          <a:prstGeom prst="rect">
+            <a:avLst/>
+          </a:prstGeom>
+        </p:spPr>
+      </p:pic>
+    </p:spTree>
+    <p:extLst>
+      <p:ext uri="{BB962C8B-B14F-4D97-AF65-F5344CB8AC3E}">
+        <p14:creationId xmlns:p14="http://schemas.microsoft.com/office/powerpoint/2010/main" val="3805703290"/>
+      </p:ext>
+    </p:extLst>
+  </p:cSld>
+  <p:clrMapOvr>
+    <a:masterClrMapping/>
+  </p:clrMapOvr>
+</p:sld>
+</file>
+
+<file path=ppt/slides/slide8.xml><?xml version="1.0" encoding="utf-8"?>
+<p:sld xmlns:a="http://schemas.openxmlformats.org/drawingml/2006/main" xmlns:r="http://schemas.openxmlformats.org/officeDocument/2006/relationships" xmlns:p="http://schemas.openxmlformats.org/presentationml/2006/main">
+  <p:cSld>
+    <p:spTree>
+      <p:nvGrpSpPr>
+        <p:cNvPr id="1" name=""/>
+        <p:cNvGrpSpPr/>
+        <p:nvPr/>
+      </p:nvGrpSpPr>
+      <p:grpSpPr>
+        <a:xfrm>
+          <a:off x="0" y="0"/>
+          <a:ext cx="0" cy="0"/>
+          <a:chOff x="0" y="0"/>
+          <a:chExt cx="0" cy="0"/>
+        </a:xfrm>
+      </p:grpSpPr>
+      <p:sp>
+        <p:nvSpPr>
+          <p:cNvPr id="2" name="Title 1">
+            <a:extLst>
+              <a:ext uri="{FF2B5EF4-FFF2-40B4-BE49-F238E27FC236}">
+                <a16:creationId xmlns:a16="http://schemas.microsoft.com/office/drawing/2014/main" id="{10DB27AC-06D3-470B-8164-E75FF7B594B2}"/>
+              </a:ext>
+            </a:extLst>
+          </p:cNvPr>
+          <p:cNvSpPr>
+            <a:spLocks noGrp="1"/>
+          </p:cNvSpPr>
+          <p:nvPr>
+            <p:ph type="title"/>
+          </p:nvPr>
+        </p:nvSpPr>
+        <p:spPr/>
+        <p:txBody>
+          <a:bodyPr/>
+          <a:lstStyle/>
+          <a:p>
+            <a:r>
+              <a:rPr lang="en-US" dirty="0"/>
+              <a:t>Project-Based Workflow</a:t>
+            </a:r>
+          </a:p>
+        </p:txBody>
+      </p:sp>
+      <p:sp>
+        <p:nvSpPr>
+          <p:cNvPr id="5" name="AutoShape 6">
+            <a:extLst>
+              <a:ext uri="{FF2B5EF4-FFF2-40B4-BE49-F238E27FC236}">
+                <a16:creationId xmlns:a16="http://schemas.microsoft.com/office/drawing/2014/main" id="{43170AE7-A2E3-40F4-A669-2085661DC4A1}"/>
+              </a:ext>
+            </a:extLst>
+          </p:cNvPr>
+          <p:cNvSpPr>
+            <a:spLocks noChangeAspect="1" noChangeArrowheads="1"/>
+          </p:cNvSpPr>
+          <p:nvPr/>
+        </p:nvSpPr>
+        <p:spPr bwMode="auto">
+          <a:xfrm>
+            <a:off x="5943600" y="3276600"/>
+            <a:ext cx="304800" cy="304800"/>
+          </a:xfrm>
+          <a:prstGeom prst="rect">
+            <a:avLst/>
+          </a:prstGeom>
+          <a:noFill/>
+          <a:extLst>
+            <a:ext uri="{909E8E84-426E-40DD-AFC4-6F175D3DCCD1}">
+              <a14:hiddenFill xmlns:a14="http://schemas.microsoft.com/office/drawing/2010/main">
+                <a:solidFill>
+                  <a:srgbClr val="FFFFFF"/>
+                </a:solidFill>
+              </a14:hiddenFill>
+            </a:ext>
+          </a:extLst>
+        </p:spPr>
+        <p:txBody>
+          <a:bodyPr vert="horz" wrap="square" lIns="91440" tIns="45720" rIns="91440" bIns="45720" numCol="1" anchor="t" anchorCtr="0" compatLnSpc="1">
+            <a:prstTxWarp prst="textNoShape">
+              <a:avLst/>
+            </a:prstTxWarp>
+          </a:bodyPr>
+          <a:lstStyle/>
+          <a:p>
+            <a:endParaRPr lang="en-US"/>
+          </a:p>
+        </p:txBody>
+      </p:sp>
+      <p:pic>
+        <p:nvPicPr>
+          <p:cNvPr id="4" name="Picture 3">
+            <a:extLst>
+              <a:ext uri="{FF2B5EF4-FFF2-40B4-BE49-F238E27FC236}">
+                <a16:creationId xmlns:a16="http://schemas.microsoft.com/office/drawing/2014/main" id="{8DBD8CAF-9ECC-4514-88F6-F555E3E357E0}"/>
+              </a:ext>
+            </a:extLst>
+          </p:cNvPr>
+          <p:cNvPicPr>
+            <a:picLocks noChangeAspect="1"/>
+          </p:cNvPicPr>
+          <p:nvPr/>
+        </p:nvPicPr>
+        <p:blipFill>
+          <a:blip r:embed="rId2"/>
+          <a:stretch>
+            <a:fillRect/>
+          </a:stretch>
+        </p:blipFill>
+        <p:spPr>
+          <a:xfrm>
+            <a:off x="2053161" y="2055043"/>
+            <a:ext cx="8085678" cy="3284975"/>
+          </a:xfrm>
+          <a:prstGeom prst="rect">
+            <a:avLst/>
+          </a:prstGeom>
+        </p:spPr>
+      </p:pic>
+    </p:spTree>
+    <p:extLst>
+      <p:ext uri="{BB962C8B-B14F-4D97-AF65-F5344CB8AC3E}">
+        <p14:creationId xmlns:p14="http://schemas.microsoft.com/office/powerpoint/2010/main" val="2589444554"/>
+      </p:ext>
+    </p:extLst>
+  </p:cSld>
+  <p:clrMapOvr>
+    <a:masterClrMapping/>
+  </p:clrMapOvr>
+</p:sld>
+</file>
+
+<file path=ppt/slides/slide9.xml><?xml version="1.0" encoding="utf-8"?>
+<p:sld xmlns:a="http://schemas.openxmlformats.org/drawingml/2006/main" xmlns:r="http://schemas.openxmlformats.org/officeDocument/2006/relationships" xmlns:p="http://schemas.openxmlformats.org/presentationml/2006/main">
+  <p:cSld>
+    <p:spTree>
+      <p:nvGrpSpPr>
+        <p:cNvPr id="1" name=""/>
+        <p:cNvGrpSpPr/>
+        <p:nvPr/>
+      </p:nvGrpSpPr>
+      <p:grpSpPr>
+        <a:xfrm>
+          <a:off x="0" y="0"/>
+          <a:ext cx="0" cy="0"/>
+          <a:chOff x="0" y="0"/>
+          <a:chExt cx="0" cy="0"/>
+        </a:xfrm>
+      </p:grpSpPr>
+      <p:sp>
+        <p:nvSpPr>
+          <p:cNvPr id="2" name="Title 1">
+            <a:extLst>
+              <a:ext uri="{FF2B5EF4-FFF2-40B4-BE49-F238E27FC236}">
+                <a16:creationId xmlns:a16="http://schemas.microsoft.com/office/drawing/2014/main" id="{10DB27AC-06D3-470B-8164-E75FF7B594B2}"/>
+              </a:ext>
+            </a:extLst>
+          </p:cNvPr>
+          <p:cNvSpPr>
+            <a:spLocks noGrp="1"/>
+          </p:cNvSpPr>
+          <p:nvPr>
+            <p:ph type="title"/>
+          </p:nvPr>
+        </p:nvSpPr>
+        <p:spPr/>
+        <p:txBody>
+          <a:bodyPr/>
+          <a:lstStyle/>
+          <a:p>
+            <a:r>
+              <a:rPr lang="en-US" dirty="0"/>
+              <a:t>Project-Based Workflow</a:t>
+            </a:r>
+          </a:p>
+        </p:txBody>
+      </p:sp>
+      <p:sp>
+        <p:nvSpPr>
+          <p:cNvPr id="5" name="AutoShape 6">
+            <a:extLst>
+              <a:ext uri="{FF2B5EF4-FFF2-40B4-BE49-F238E27FC236}">
+                <a16:creationId xmlns:a16="http://schemas.microsoft.com/office/drawing/2014/main" id="{43170AE7-A2E3-40F4-A669-2085661DC4A1}"/>
+              </a:ext>
+            </a:extLst>
+          </p:cNvPr>
+          <p:cNvSpPr>
+            <a:spLocks noChangeAspect="1" noChangeArrowheads="1"/>
+          </p:cNvSpPr>
+          <p:nvPr/>
+        </p:nvSpPr>
+        <p:spPr bwMode="auto">
+          <a:xfrm>
+            <a:off x="5943600" y="3276600"/>
+            <a:ext cx="304800" cy="304800"/>
+          </a:xfrm>
+          <a:prstGeom prst="rect">
+            <a:avLst/>
+          </a:prstGeom>
+          <a:noFill/>
+          <a:extLst>
+            <a:ext uri="{909E8E84-426E-40DD-AFC4-6F175D3DCCD1}">
+              <a14:hiddenFill xmlns:a14="http://schemas.microsoft.com/office/drawing/2010/main">
+                <a:solidFill>
+                  <a:srgbClr val="FFFFFF"/>
+                </a:solidFill>
+              </a14:hiddenFill>
+            </a:ext>
+          </a:extLst>
+        </p:spPr>
+        <p:txBody>
+          <a:bodyPr vert="horz" wrap="square" lIns="91440" tIns="45720" rIns="91440" bIns="45720" numCol="1" anchor="t" anchorCtr="0" compatLnSpc="1">
+            <a:prstTxWarp prst="textNoShape">
+              <a:avLst/>
+            </a:prstTxWarp>
+          </a:bodyPr>
+          <a:lstStyle/>
+          <a:p>
+            <a:endParaRPr lang="en-US"/>
+          </a:p>
+        </p:txBody>
+      </p:sp>
+      <p:pic>
+        <p:nvPicPr>
+          <p:cNvPr id="3" name="Picture 2">
+            <a:extLst>
+              <a:ext uri="{FF2B5EF4-FFF2-40B4-BE49-F238E27FC236}">
+                <a16:creationId xmlns:a16="http://schemas.microsoft.com/office/drawing/2014/main" id="{FD29B129-E075-4592-A2D9-962BA6DDAD16}"/>
+              </a:ext>
+            </a:extLst>
+          </p:cNvPr>
+          <p:cNvPicPr>
+            <a:picLocks noChangeAspect="1"/>
+          </p:cNvPicPr>
+          <p:nvPr/>
+        </p:nvPicPr>
+        <p:blipFill>
+          <a:blip r:embed="rId2"/>
+          <a:stretch>
+            <a:fillRect/>
+          </a:stretch>
+        </p:blipFill>
+        <p:spPr>
+          <a:xfrm>
+            <a:off x="1238053" y="1690688"/>
+            <a:ext cx="9411093" cy="3951791"/>
+          </a:xfrm>
+          <a:prstGeom prst="rect">
+            <a:avLst/>
+          </a:prstGeom>
+        </p:spPr>
+      </p:pic>
+    </p:spTree>
+    <p:extLst>
+      <p:ext uri="{BB962C8B-B14F-4D97-AF65-F5344CB8AC3E}">
+        <p14:creationId xmlns:p14="http://schemas.microsoft.com/office/powerpoint/2010/main" val="2322350545"/>
       </p:ext>
     </p:extLst>
   </p:cSld>

</xml_diff>